<commit_message>
New version of pptx
</commit_message>
<xml_diff>
--- a/ReWired Filament.pptx
+++ b/ReWired Filament.pptx
@@ -10,8 +10,9 @@
     <p:sldId id="258" r:id="rId4"/>
     <p:sldId id="259" r:id="rId5"/>
     <p:sldId id="260" r:id="rId6"/>
-    <p:sldId id="262" r:id="rId7"/>
-    <p:sldId id="261" r:id="rId8"/>
+    <p:sldId id="263" r:id="rId7"/>
+    <p:sldId id="262" r:id="rId8"/>
+    <p:sldId id="261" r:id="rId9"/>
   </p:sldIdLst>
   <p:sldSz cx="12192000" cy="6858000"/>
   <p:notesSz cx="6858000" cy="9144000"/>
@@ -110,6 +111,11 @@
       </a:defRPr>
     </a:lvl9pPr>
   </p:defaultTextStyle>
+  <p:extLst>
+    <p:ext uri="{EFAFB233-063F-42B5-8137-9DF3F51BA10A}">
+      <p15:sldGuideLst xmlns:p15="http://schemas.microsoft.com/office/powerpoint/2012/main"/>
+    </p:ext>
+  </p:extLst>
 </p:presentation>
 </file>
 
@@ -6447,6 +6453,145 @@
           <a:p>
             <a:r>
               <a:rPr lang="es-ES" sz="6000" dirty="0"/>
+              <a:t>Empresas: </a:t>
+            </a:r>
+          </a:p>
+        </p:txBody>
+      </p:sp>
+      <p:sp>
+        <p:nvSpPr>
+          <p:cNvPr id="3" name="Marcador de contenido 2">
+            <a:extLst>
+              <a:ext uri="{FF2B5EF4-FFF2-40B4-BE49-F238E27FC236}">
+                <a16:creationId xmlns:a16="http://schemas.microsoft.com/office/drawing/2014/main" id="{2AF4B92A-C3A6-4DFD-9AD6-41DAAD8352D3}"/>
+              </a:ext>
+            </a:extLst>
+          </p:cNvPr>
+          <p:cNvSpPr>
+            <a:spLocks noGrp="1"/>
+          </p:cNvSpPr>
+          <p:nvPr>
+            <p:ph idx="1"/>
+          </p:nvPr>
+        </p:nvSpPr>
+        <p:spPr>
+          <a:xfrm>
+            <a:off x="677333" y="2160589"/>
+            <a:ext cx="9341309" cy="3880773"/>
+          </a:xfrm>
+        </p:spPr>
+        <p:txBody>
+          <a:bodyPr>
+            <a:normAutofit/>
+          </a:bodyPr>
+          <a:lstStyle/>
+          <a:p>
+            <a:pPr>
+              <a:buFontTx/>
+              <a:buChar char="-"/>
+            </a:pPr>
+            <a:r>
+              <a:rPr lang="es-ES" sz="3600" dirty="0"/>
+              <a:t>5 Niveles de </a:t>
+            </a:r>
+            <a:r>
+              <a:rPr lang="es-ES" sz="3600" b="1" dirty="0"/>
+              <a:t>Certificados de Responsabilidad </a:t>
+            </a:r>
+            <a:r>
+              <a:rPr lang="es-ES" sz="3600" dirty="0"/>
+              <a:t>con el </a:t>
+            </a:r>
+            <a:r>
+              <a:rPr lang="es-ES" sz="3600" b="1" dirty="0"/>
+              <a:t>Medio Ambiente</a:t>
+            </a:r>
+            <a:br>
+              <a:rPr lang="es-ES" sz="3600" b="1" dirty="0"/>
+            </a:br>
+            <a:r>
+              <a:rPr lang="es-ES" sz="2800" b="1" dirty="0">
+                <a:solidFill>
+                  <a:schemeClr val="bg1"/>
+                </a:solidFill>
+              </a:rPr>
+              <a:t>_</a:t>
+            </a:r>
+          </a:p>
+          <a:p>
+            <a:pPr>
+              <a:buFontTx/>
+              <a:buChar char="-"/>
+            </a:pPr>
+            <a:r>
+              <a:rPr lang="es-ES" sz="3600" b="1" dirty="0"/>
+              <a:t>Remuneración económica a empresas Afiliadas</a:t>
+            </a:r>
+          </a:p>
+          <a:p>
+            <a:pPr>
+              <a:buFontTx/>
+              <a:buChar char="-"/>
+            </a:pPr>
+            <a:endParaRPr lang="es-ES" sz="2800" dirty="0"/>
+          </a:p>
+        </p:txBody>
+      </p:sp>
+    </p:spTree>
+    <p:extLst>
+      <p:ext uri="{BB962C8B-B14F-4D97-AF65-F5344CB8AC3E}">
+        <p14:creationId xmlns:p14="http://schemas.microsoft.com/office/powerpoint/2010/main" val="855342868"/>
+      </p:ext>
+    </p:extLst>
+  </p:cSld>
+  <p:clrMapOvr>
+    <a:masterClrMapping/>
+  </p:clrMapOvr>
+</p:sld>
+</file>
+
+<file path=ppt/slides/slide7.xml><?xml version="1.0" encoding="utf-8"?>
+<p:sld xmlns:a="http://schemas.openxmlformats.org/drawingml/2006/main" xmlns:r="http://schemas.openxmlformats.org/officeDocument/2006/relationships" xmlns:p="http://schemas.openxmlformats.org/presentationml/2006/main">
+  <p:cSld>
+    <p:spTree>
+      <p:nvGrpSpPr>
+        <p:cNvPr id="1" name=""/>
+        <p:cNvGrpSpPr/>
+        <p:nvPr/>
+      </p:nvGrpSpPr>
+      <p:grpSpPr>
+        <a:xfrm>
+          <a:off x="0" y="0"/>
+          <a:ext cx="0" cy="0"/>
+          <a:chOff x="0" y="0"/>
+          <a:chExt cx="0" cy="0"/>
+        </a:xfrm>
+      </p:grpSpPr>
+      <p:sp>
+        <p:nvSpPr>
+          <p:cNvPr id="2" name="Título 1">
+            <a:extLst>
+              <a:ext uri="{FF2B5EF4-FFF2-40B4-BE49-F238E27FC236}">
+                <a16:creationId xmlns:a16="http://schemas.microsoft.com/office/drawing/2014/main" id="{EFA82755-6E0F-4D1F-9B6A-E469BFB64260}"/>
+              </a:ext>
+            </a:extLst>
+          </p:cNvPr>
+          <p:cNvSpPr>
+            <a:spLocks noGrp="1"/>
+          </p:cNvSpPr>
+          <p:nvPr>
+            <p:ph type="title"/>
+          </p:nvPr>
+        </p:nvSpPr>
+        <p:spPr/>
+        <p:txBody>
+          <a:bodyPr>
+            <a:normAutofit/>
+          </a:bodyPr>
+          <a:lstStyle/>
+          <a:p>
+            <a:r>
+              <a:rPr lang="es-ES" sz="6000" dirty="0"/>
               <a:t>Nuestra App: </a:t>
             </a:r>
           </a:p>
@@ -6475,11 +6620,58 @@
         </p:blipFill>
         <p:spPr>
           <a:xfrm>
-            <a:off x="4337538" y="1930399"/>
+            <a:off x="1607590" y="2062921"/>
             <a:ext cx="2771775" cy="4318001"/>
           </a:xfrm>
         </p:spPr>
       </p:pic>
+      <p:sp>
+        <p:nvSpPr>
+          <p:cNvPr id="4" name="CuadroTexto 3">
+            <a:extLst>
+              <a:ext uri="{FF2B5EF4-FFF2-40B4-BE49-F238E27FC236}">
+                <a16:creationId xmlns:a16="http://schemas.microsoft.com/office/drawing/2014/main" id="{124DF437-E755-46EC-80DD-6C621CDF7662}"/>
+              </a:ext>
+            </a:extLst>
+          </p:cNvPr>
+          <p:cNvSpPr txBox="1"/>
+          <p:nvPr/>
+        </p:nvSpPr>
+        <p:spPr>
+          <a:xfrm>
+            <a:off x="5433391" y="2517913"/>
+            <a:ext cx="3299792" cy="2308324"/>
+          </a:xfrm>
+          <a:prstGeom prst="rect">
+            <a:avLst/>
+          </a:prstGeom>
+          <a:noFill/>
+        </p:spPr>
+        <p:txBody>
+          <a:bodyPr wrap="square" rtlCol="0">
+            <a:spAutoFit/>
+          </a:bodyPr>
+          <a:lstStyle/>
+          <a:p>
+            <a:r>
+              <a:rPr lang="es-ES" dirty="0"/>
+              <a:t>Analítica de datos para saber cuales son las ciudades que más reciclan</a:t>
+            </a:r>
+          </a:p>
+          <a:p>
+            <a:endParaRPr lang="es-ES" dirty="0"/>
+          </a:p>
+          <a:p>
+            <a:endParaRPr lang="es-ES" dirty="0"/>
+          </a:p>
+          <a:p>
+            <a:r>
+              <a:rPr lang="es-ES" dirty="0"/>
+              <a:t>Publicación de los Datos de forma trimestral para incentivar el reciclaje</a:t>
+            </a:r>
+          </a:p>
+        </p:txBody>
+      </p:sp>
     </p:spTree>
     <p:extLst>
       <p:ext uri="{BB962C8B-B14F-4D97-AF65-F5344CB8AC3E}">
@@ -6493,7 +6685,7 @@
 </p:sld>
 </file>
 
-<file path=ppt/slides/slide7.xml><?xml version="1.0" encoding="utf-8"?>
+<file path=ppt/slides/slide8.xml><?xml version="1.0" encoding="utf-8"?>
 <p:sld xmlns:a="http://schemas.openxmlformats.org/drawingml/2006/main" xmlns:r="http://schemas.openxmlformats.org/officeDocument/2006/relationships" xmlns:p="http://schemas.openxmlformats.org/presentationml/2006/main">
   <p:cSld>
     <p:spTree>

</xml_diff>